<commit_message>
Update 04  Gen AI -Tools for researchers.pptx
</commit_message>
<xml_diff>
--- a/slides/04  Gen AI -Tools for researchers.pptx
+++ b/slides/04  Gen AI -Tools for researchers.pptx
@@ -5796,6 +5796,27 @@
             <a:r>
               <a:rPr lang="en-US"/>
               <a:t>semanticscholar.org</a:t>
+            </a:r>
+            <a:endParaRPr lang="en-US"/>
+          </a:p>
+          <a:p>
+            <a:r>
+              <a:rPr lang="en-US"/>
+              <a:t>openread.academy</a:t>
+            </a:r>
+            <a:endParaRPr lang="en-US"/>
+          </a:p>
+          <a:p>
+            <a:r>
+              <a:rPr lang="en-US"/>
+              <a:t>tavily.com</a:t>
+            </a:r>
+            <a:endParaRPr lang="en-US"/>
+          </a:p>
+          <a:p>
+            <a:r>
+              <a:rPr lang="en-US"/>
+              <a:t>powerdrill.ai</a:t>
             </a:r>
             <a:endParaRPr lang="en-US"/>
           </a:p>

</xml_diff>